<commit_message>
feat(modal): modal uses dedicated class - skills about object started - about-me -> about
</commit_message>
<xml_diff>
--- a/portfolio_layout.pptx
+++ b/portfolio_layout.pptx
@@ -4025,7 +4025,7 @@
         </p:nvSpPr>
         <p:spPr>
           <a:xfrm>
-            <a:off x="1816402" y="2552048"/>
+            <a:off x="548843" y="2532882"/>
             <a:ext cx="1004180" cy="837589"/>
           </a:xfrm>
           <a:prstGeom prst="rect">
@@ -4166,7 +4166,7 @@
         </p:nvSpPr>
         <p:spPr>
           <a:xfrm>
-            <a:off x="1868960" y="2628046"/>
+            <a:off x="601401" y="2608880"/>
             <a:ext cx="928347" cy="410217"/>
           </a:xfrm>
           <a:prstGeom prst="rect">
@@ -4356,7 +4356,7 @@
         </p:nvGrpSpPr>
         <p:grpSpPr>
           <a:xfrm>
-            <a:off x="544984" y="2545507"/>
+            <a:off x="1823363" y="2532882"/>
             <a:ext cx="1004180" cy="837589"/>
             <a:chOff x="3696731" y="2536643"/>
             <a:chExt cx="1004180" cy="837589"/>
@@ -4450,7 +4450,7 @@
             <a:lstStyle/>
             <a:p>
               <a:pPr algn="ctr"/>
-              <a:endParaRPr lang="en-US"/>
+              <a:endParaRPr lang="en-US" dirty="0"/>
             </a:p>
           </p:txBody>
         </p:sp>
@@ -4498,7 +4498,7 @@
               <a:pPr algn="ctr"/>
               <a:r>
                 <a:rPr lang="en-US" sz="900" dirty="0"/>
-                <a:t>Background </a:t>
+                <a:t>Skills </a:t>
               </a:r>
             </a:p>
           </p:txBody>

</xml_diff>